<commit_message>
Edtes to User Guide.
</commit_message>
<xml_diff>
--- a/UserGuide/images/imagecreator.pptx
+++ b/UserGuide/images/imagecreator.pptx
@@ -6,9 +6,11 @@
   </p:sldMasterIdLst>
   <p:sldIdLst>
     <p:sldId id="256" r:id="rId2"/>
-    <p:sldId id="257" r:id="rId3"/>
-    <p:sldId id="258" r:id="rId4"/>
-    <p:sldId id="259" r:id="rId5"/>
+    <p:sldId id="260" r:id="rId3"/>
+    <p:sldId id="257" r:id="rId4"/>
+    <p:sldId id="261" r:id="rId5"/>
+    <p:sldId id="258" r:id="rId6"/>
+    <p:sldId id="259" r:id="rId7"/>
   </p:sldIdLst>
   <p:sldSz cx="12192000" cy="6858000"/>
   <p:notesSz cx="6858000" cy="9144000"/>
@@ -3516,6 +3518,504 @@
       </p:grpSpPr>
       <p:pic>
         <p:nvPicPr>
+          <p:cNvPr id="13" name="Picture 12">
+            <a:extLst>
+              <a:ext uri="{FF2B5EF4-FFF2-40B4-BE49-F238E27FC236}">
+                <a16:creationId xmlns:a16="http://schemas.microsoft.com/office/drawing/2014/main" id="{FBE1841F-F7EF-40E0-9D21-C155E132B297}"/>
+              </a:ext>
+            </a:extLst>
+          </p:cNvPr>
+          <p:cNvPicPr>
+            <a:picLocks noChangeAspect="1"/>
+          </p:cNvPicPr>
+          <p:nvPr/>
+        </p:nvPicPr>
+        <p:blipFill rotWithShape="1">
+          <a:blip r:embed="rId2"/>
+          <a:srcRect b="15716"/>
+          <a:stretch/>
+        </p:blipFill>
+        <p:spPr>
+          <a:xfrm>
+            <a:off x="0" y="150693"/>
+            <a:ext cx="12192000" cy="5526208"/>
+          </a:xfrm>
+          <a:prstGeom prst="rect">
+            <a:avLst/>
+          </a:prstGeom>
+        </p:spPr>
+      </p:pic>
+      <p:sp>
+        <p:nvSpPr>
+          <p:cNvPr id="8" name="Oval 7">
+            <a:extLst>
+              <a:ext uri="{FF2B5EF4-FFF2-40B4-BE49-F238E27FC236}">
+                <a16:creationId xmlns:a16="http://schemas.microsoft.com/office/drawing/2014/main" id="{232A94A2-0A4B-4AF4-87CE-AABA0D40AA71}"/>
+              </a:ext>
+            </a:extLst>
+          </p:cNvPr>
+          <p:cNvSpPr/>
+          <p:nvPr/>
+        </p:nvSpPr>
+        <p:spPr>
+          <a:xfrm>
+            <a:off x="1379858" y="1313225"/>
+            <a:ext cx="220470" cy="211750"/>
+          </a:xfrm>
+          <a:prstGeom prst="ellipse">
+            <a:avLst/>
+          </a:prstGeom>
+          <a:solidFill>
+            <a:schemeClr val="bg1"/>
+          </a:solidFill>
+          <a:ln w="12700">
+            <a:solidFill>
+              <a:schemeClr val="tx2"/>
+            </a:solidFill>
+          </a:ln>
+        </p:spPr>
+        <p:style>
+          <a:lnRef idx="2">
+            <a:schemeClr val="accent1">
+              <a:shade val="50000"/>
+            </a:schemeClr>
+          </a:lnRef>
+          <a:fillRef idx="1">
+            <a:schemeClr val="accent1"/>
+          </a:fillRef>
+          <a:effectRef idx="0">
+            <a:schemeClr val="accent1"/>
+          </a:effectRef>
+          <a:fontRef idx="minor">
+            <a:schemeClr val="lt1"/>
+          </a:fontRef>
+        </p:style>
+        <p:txBody>
+          <a:bodyPr rtlCol="0" anchor="ctr"/>
+          <a:lstStyle/>
+          <a:p>
+            <a:pPr algn="ctr"/>
+            <a:r>
+              <a:rPr lang="en-SG" sz="1600" dirty="0">
+                <a:solidFill>
+                  <a:schemeClr val="tx2"/>
+                </a:solidFill>
+              </a:rPr>
+              <a:t>1</a:t>
+            </a:r>
+          </a:p>
+        </p:txBody>
+      </p:sp>
+      <p:sp>
+        <p:nvSpPr>
+          <p:cNvPr id="9" name="Oval 8">
+            <a:extLst>
+              <a:ext uri="{FF2B5EF4-FFF2-40B4-BE49-F238E27FC236}">
+                <a16:creationId xmlns:a16="http://schemas.microsoft.com/office/drawing/2014/main" id="{65F1D0C4-4DB8-41B9-87D3-2B7BD53C6955}"/>
+              </a:ext>
+            </a:extLst>
+          </p:cNvPr>
+          <p:cNvSpPr/>
+          <p:nvPr/>
+        </p:nvSpPr>
+        <p:spPr>
+          <a:xfrm>
+            <a:off x="7495654" y="458027"/>
+            <a:ext cx="220470" cy="211750"/>
+          </a:xfrm>
+          <a:prstGeom prst="ellipse">
+            <a:avLst/>
+          </a:prstGeom>
+          <a:solidFill>
+            <a:schemeClr val="bg1"/>
+          </a:solidFill>
+          <a:ln w="12700">
+            <a:solidFill>
+              <a:schemeClr val="tx2"/>
+            </a:solidFill>
+          </a:ln>
+        </p:spPr>
+        <p:style>
+          <a:lnRef idx="2">
+            <a:schemeClr val="accent1">
+              <a:shade val="50000"/>
+            </a:schemeClr>
+          </a:lnRef>
+          <a:fillRef idx="1">
+            <a:schemeClr val="accent1"/>
+          </a:fillRef>
+          <a:effectRef idx="0">
+            <a:schemeClr val="accent1"/>
+          </a:effectRef>
+          <a:fontRef idx="minor">
+            <a:schemeClr val="lt1"/>
+          </a:fontRef>
+        </p:style>
+        <p:txBody>
+          <a:bodyPr rtlCol="0" anchor="ctr"/>
+          <a:lstStyle/>
+          <a:p>
+            <a:pPr algn="ctr"/>
+            <a:r>
+              <a:rPr lang="en-SG" sz="1600" dirty="0">
+                <a:solidFill>
+                  <a:schemeClr val="tx2"/>
+                </a:solidFill>
+              </a:rPr>
+              <a:t>2</a:t>
+            </a:r>
+          </a:p>
+        </p:txBody>
+      </p:sp>
+      <p:sp>
+        <p:nvSpPr>
+          <p:cNvPr id="10" name="Rectangle 9">
+            <a:extLst>
+              <a:ext uri="{FF2B5EF4-FFF2-40B4-BE49-F238E27FC236}">
+                <a16:creationId xmlns:a16="http://schemas.microsoft.com/office/drawing/2014/main" id="{A3C9CF08-3F41-4BA5-8B9F-D9D6EB3AC05B}"/>
+              </a:ext>
+            </a:extLst>
+          </p:cNvPr>
+          <p:cNvSpPr/>
+          <p:nvPr/>
+        </p:nvSpPr>
+        <p:spPr>
+          <a:xfrm>
+            <a:off x="1756793" y="1243766"/>
+            <a:ext cx="4977381" cy="518359"/>
+          </a:xfrm>
+          <a:prstGeom prst="rect">
+            <a:avLst/>
+          </a:prstGeom>
+          <a:noFill/>
+          <a:ln w="38100">
+            <a:solidFill>
+              <a:srgbClr val="FF0000"/>
+            </a:solidFill>
+          </a:ln>
+        </p:spPr>
+        <p:style>
+          <a:lnRef idx="2">
+            <a:schemeClr val="accent1">
+              <a:shade val="50000"/>
+            </a:schemeClr>
+          </a:lnRef>
+          <a:fillRef idx="1">
+            <a:schemeClr val="accent1"/>
+          </a:fillRef>
+          <a:effectRef idx="0">
+            <a:schemeClr val="accent1"/>
+          </a:effectRef>
+          <a:fontRef idx="minor">
+            <a:schemeClr val="lt1"/>
+          </a:fontRef>
+        </p:style>
+        <p:txBody>
+          <a:bodyPr rtlCol="0" anchor="ctr"/>
+          <a:lstStyle/>
+          <a:p>
+            <a:pPr algn="ctr"/>
+            <a:endParaRPr lang="en-SG" dirty="0"/>
+          </a:p>
+        </p:txBody>
+      </p:sp>
+      <p:sp>
+        <p:nvSpPr>
+          <p:cNvPr id="11" name="Rectangle 10">
+            <a:extLst>
+              <a:ext uri="{FF2B5EF4-FFF2-40B4-BE49-F238E27FC236}">
+                <a16:creationId xmlns:a16="http://schemas.microsoft.com/office/drawing/2014/main" id="{FA602467-8BFA-4DF8-9A81-0189DE6BC8C6}"/>
+              </a:ext>
+            </a:extLst>
+          </p:cNvPr>
+          <p:cNvSpPr/>
+          <p:nvPr/>
+        </p:nvSpPr>
+        <p:spPr>
+          <a:xfrm>
+            <a:off x="1756793" y="1762125"/>
+            <a:ext cx="4977381" cy="541941"/>
+          </a:xfrm>
+          <a:prstGeom prst="rect">
+            <a:avLst/>
+          </a:prstGeom>
+          <a:noFill/>
+          <a:ln w="38100">
+            <a:solidFill>
+              <a:srgbClr val="FF0000"/>
+            </a:solidFill>
+          </a:ln>
+        </p:spPr>
+        <p:style>
+          <a:lnRef idx="2">
+            <a:schemeClr val="accent1">
+              <a:shade val="50000"/>
+            </a:schemeClr>
+          </a:lnRef>
+          <a:fillRef idx="1">
+            <a:schemeClr val="accent1"/>
+          </a:fillRef>
+          <a:effectRef idx="0">
+            <a:schemeClr val="accent1"/>
+          </a:effectRef>
+          <a:fontRef idx="minor">
+            <a:schemeClr val="lt1"/>
+          </a:fontRef>
+        </p:style>
+        <p:txBody>
+          <a:bodyPr rtlCol="0" anchor="ctr"/>
+          <a:lstStyle/>
+          <a:p>
+            <a:pPr algn="ctr"/>
+            <a:endParaRPr lang="en-SG" dirty="0"/>
+          </a:p>
+        </p:txBody>
+      </p:sp>
+      <p:pic>
+        <p:nvPicPr>
+          <p:cNvPr id="15" name="Picture 14">
+            <a:extLst>
+              <a:ext uri="{FF2B5EF4-FFF2-40B4-BE49-F238E27FC236}">
+                <a16:creationId xmlns:a16="http://schemas.microsoft.com/office/drawing/2014/main" id="{5D2E06AD-C4ED-48D2-88E3-38ADB4167443}"/>
+              </a:ext>
+            </a:extLst>
+          </p:cNvPr>
+          <p:cNvPicPr>
+            <a:picLocks noChangeAspect="1"/>
+          </p:cNvPicPr>
+          <p:nvPr/>
+        </p:nvPicPr>
+        <p:blipFill>
+          <a:blip r:embed="rId3"/>
+          <a:stretch>
+            <a:fillRect/>
+          </a:stretch>
+        </p:blipFill>
+        <p:spPr>
+          <a:xfrm>
+            <a:off x="7762354" y="260730"/>
+            <a:ext cx="4162946" cy="1497386"/>
+          </a:xfrm>
+          <a:prstGeom prst="rect">
+            <a:avLst/>
+          </a:prstGeom>
+        </p:spPr>
+      </p:pic>
+      <p:pic>
+        <p:nvPicPr>
+          <p:cNvPr id="17" name="Picture 16">
+            <a:extLst>
+              <a:ext uri="{FF2B5EF4-FFF2-40B4-BE49-F238E27FC236}">
+                <a16:creationId xmlns:a16="http://schemas.microsoft.com/office/drawing/2014/main" id="{965BB36E-167B-4085-A845-584172EE2F8B}"/>
+              </a:ext>
+            </a:extLst>
+          </p:cNvPr>
+          <p:cNvPicPr>
+            <a:picLocks noChangeAspect="1"/>
+          </p:cNvPicPr>
+          <p:nvPr/>
+        </p:nvPicPr>
+        <p:blipFill>
+          <a:blip r:embed="rId4"/>
+          <a:stretch>
+            <a:fillRect/>
+          </a:stretch>
+        </p:blipFill>
+        <p:spPr>
+          <a:xfrm>
+            <a:off x="7788944" y="1868153"/>
+            <a:ext cx="4109765" cy="1433393"/>
+          </a:xfrm>
+          <a:prstGeom prst="rect">
+            <a:avLst/>
+          </a:prstGeom>
+        </p:spPr>
+      </p:pic>
+      <p:cxnSp>
+        <p:nvCxnSpPr>
+          <p:cNvPr id="18" name="Straight Arrow Connector 17">
+            <a:extLst>
+              <a:ext uri="{FF2B5EF4-FFF2-40B4-BE49-F238E27FC236}">
+                <a16:creationId xmlns:a16="http://schemas.microsoft.com/office/drawing/2014/main" id="{D05E8162-809B-4988-A37D-7AC828492979}"/>
+              </a:ext>
+            </a:extLst>
+          </p:cNvPr>
+          <p:cNvCxnSpPr>
+            <a:cxnSpLocks/>
+            <a:stCxn id="10" idx="3"/>
+            <a:endCxn id="15" idx="1"/>
+          </p:cNvCxnSpPr>
+          <p:nvPr/>
+        </p:nvCxnSpPr>
+        <p:spPr>
+          <a:xfrm flipV="1">
+            <a:off x="6734174" y="1009423"/>
+            <a:ext cx="1028180" cy="493523"/>
+          </a:xfrm>
+          <a:prstGeom prst="straightConnector1">
+            <a:avLst/>
+          </a:prstGeom>
+          <a:ln w="28575">
+            <a:solidFill>
+              <a:srgbClr val="FF0000"/>
+            </a:solidFill>
+            <a:tailEnd type="triangle"/>
+          </a:ln>
+        </p:spPr>
+        <p:style>
+          <a:lnRef idx="1">
+            <a:schemeClr val="accent1"/>
+          </a:lnRef>
+          <a:fillRef idx="0">
+            <a:schemeClr val="accent1"/>
+          </a:fillRef>
+          <a:effectRef idx="0">
+            <a:schemeClr val="accent1"/>
+          </a:effectRef>
+          <a:fontRef idx="minor">
+            <a:schemeClr val="tx1"/>
+          </a:fontRef>
+        </p:style>
+      </p:cxnSp>
+      <p:cxnSp>
+        <p:nvCxnSpPr>
+          <p:cNvPr id="21" name="Straight Arrow Connector 20">
+            <a:extLst>
+              <a:ext uri="{FF2B5EF4-FFF2-40B4-BE49-F238E27FC236}">
+                <a16:creationId xmlns:a16="http://schemas.microsoft.com/office/drawing/2014/main" id="{39F5056A-E31F-4E6A-B3F5-EEC1C996CDF2}"/>
+              </a:ext>
+            </a:extLst>
+          </p:cNvPr>
+          <p:cNvCxnSpPr>
+            <a:cxnSpLocks/>
+            <a:stCxn id="11" idx="3"/>
+            <a:endCxn id="17" idx="1"/>
+          </p:cNvCxnSpPr>
+          <p:nvPr/>
+        </p:nvCxnSpPr>
+        <p:spPr>
+          <a:xfrm>
+            <a:off x="6734174" y="2033096"/>
+            <a:ext cx="1054770" cy="551754"/>
+          </a:xfrm>
+          <a:prstGeom prst="straightConnector1">
+            <a:avLst/>
+          </a:prstGeom>
+          <a:ln w="28575">
+            <a:solidFill>
+              <a:srgbClr val="FF0000"/>
+            </a:solidFill>
+            <a:tailEnd type="triangle"/>
+          </a:ln>
+        </p:spPr>
+        <p:style>
+          <a:lnRef idx="1">
+            <a:schemeClr val="accent1"/>
+          </a:lnRef>
+          <a:fillRef idx="0">
+            <a:schemeClr val="accent1"/>
+          </a:fillRef>
+          <a:effectRef idx="0">
+            <a:schemeClr val="accent1"/>
+          </a:effectRef>
+          <a:fontRef idx="minor">
+            <a:schemeClr val="tx1"/>
+          </a:fontRef>
+        </p:style>
+      </p:cxnSp>
+      <p:sp>
+        <p:nvSpPr>
+          <p:cNvPr id="24" name="Oval 23">
+            <a:extLst>
+              <a:ext uri="{FF2B5EF4-FFF2-40B4-BE49-F238E27FC236}">
+                <a16:creationId xmlns:a16="http://schemas.microsoft.com/office/drawing/2014/main" id="{09720BA7-1ED1-415A-BD8E-A4391FAE7D76}"/>
+              </a:ext>
+            </a:extLst>
+          </p:cNvPr>
+          <p:cNvSpPr/>
+          <p:nvPr/>
+        </p:nvSpPr>
+        <p:spPr>
+          <a:xfrm>
+            <a:off x="7531838" y="1911420"/>
+            <a:ext cx="220470" cy="211750"/>
+          </a:xfrm>
+          <a:prstGeom prst="ellipse">
+            <a:avLst/>
+          </a:prstGeom>
+          <a:solidFill>
+            <a:schemeClr val="bg1"/>
+          </a:solidFill>
+          <a:ln w="12700">
+            <a:solidFill>
+              <a:schemeClr val="tx2"/>
+            </a:solidFill>
+          </a:ln>
+        </p:spPr>
+        <p:style>
+          <a:lnRef idx="2">
+            <a:schemeClr val="accent1">
+              <a:shade val="50000"/>
+            </a:schemeClr>
+          </a:lnRef>
+          <a:fillRef idx="1">
+            <a:schemeClr val="accent1"/>
+          </a:fillRef>
+          <a:effectRef idx="0">
+            <a:schemeClr val="accent1"/>
+          </a:effectRef>
+          <a:fontRef idx="minor">
+            <a:schemeClr val="lt1"/>
+          </a:fontRef>
+        </p:style>
+        <p:txBody>
+          <a:bodyPr rtlCol="0" anchor="ctr"/>
+          <a:lstStyle/>
+          <a:p>
+            <a:pPr algn="ctr"/>
+            <a:r>
+              <a:rPr lang="en-SG" sz="1600" dirty="0">
+                <a:solidFill>
+                  <a:schemeClr val="tx2"/>
+                </a:solidFill>
+              </a:rPr>
+              <a:t>3</a:t>
+            </a:r>
+          </a:p>
+        </p:txBody>
+      </p:sp>
+    </p:spTree>
+    <p:extLst>
+      <p:ext uri="{BB962C8B-B14F-4D97-AF65-F5344CB8AC3E}">
+        <p14:creationId xmlns:p14="http://schemas.microsoft.com/office/powerpoint/2010/main" val="1769292577"/>
+      </p:ext>
+    </p:extLst>
+  </p:cSld>
+  <p:clrMapOvr>
+    <a:masterClrMapping/>
+  </p:clrMapOvr>
+</p:sld>
+</file>
+
+<file path=ppt/slides/slide3.xml><?xml version="1.0" encoding="utf-8"?>
+<p:sld xmlns:a="http://schemas.openxmlformats.org/drawingml/2006/main" xmlns:r="http://schemas.openxmlformats.org/officeDocument/2006/relationships" xmlns:p="http://schemas.openxmlformats.org/presentationml/2006/main">
+  <p:cSld>
+    <p:spTree>
+      <p:nvGrpSpPr>
+        <p:cNvPr id="1" name=""/>
+        <p:cNvGrpSpPr/>
+        <p:nvPr/>
+      </p:nvGrpSpPr>
+      <p:grpSpPr>
+        <a:xfrm>
+          <a:off x="0" y="0"/>
+          <a:ext cx="0" cy="0"/>
+          <a:chOff x="0" y="0"/>
+          <a:chExt cx="0" cy="0"/>
+        </a:xfrm>
+      </p:grpSpPr>
+      <p:pic>
+        <p:nvPicPr>
           <p:cNvPr id="5" name="Picture 4">
             <a:extLst>
               <a:ext uri="{FF2B5EF4-FFF2-40B4-BE49-F238E27FC236}">
@@ -3765,7 +4265,732 @@
 </p:sld>
 </file>
 
-<file path=ppt/slides/slide3.xml><?xml version="1.0" encoding="utf-8"?>
+<file path=ppt/slides/slide4.xml><?xml version="1.0" encoding="utf-8"?>
+<p:sld xmlns:a="http://schemas.openxmlformats.org/drawingml/2006/main" xmlns:r="http://schemas.openxmlformats.org/officeDocument/2006/relationships" xmlns:p="http://schemas.openxmlformats.org/presentationml/2006/main">
+  <p:cSld>
+    <p:spTree>
+      <p:nvGrpSpPr>
+        <p:cNvPr id="1" name=""/>
+        <p:cNvGrpSpPr/>
+        <p:nvPr/>
+      </p:nvGrpSpPr>
+      <p:grpSpPr>
+        <a:xfrm>
+          <a:off x="0" y="0"/>
+          <a:ext cx="0" cy="0"/>
+          <a:chOff x="0" y="0"/>
+          <a:chExt cx="0" cy="0"/>
+        </a:xfrm>
+      </p:grpSpPr>
+      <p:pic>
+        <p:nvPicPr>
+          <p:cNvPr id="5" name="Picture 4">
+            <a:extLst>
+              <a:ext uri="{FF2B5EF4-FFF2-40B4-BE49-F238E27FC236}">
+                <a16:creationId xmlns:a16="http://schemas.microsoft.com/office/drawing/2014/main" id="{1CB52D9D-EC5F-479F-A6D2-9C9F365D970E}"/>
+              </a:ext>
+            </a:extLst>
+          </p:cNvPr>
+          <p:cNvPicPr>
+            <a:picLocks noChangeAspect="1"/>
+          </p:cNvPicPr>
+          <p:nvPr/>
+        </p:nvPicPr>
+        <p:blipFill>
+          <a:blip r:embed="rId2"/>
+          <a:stretch>
+            <a:fillRect/>
+          </a:stretch>
+        </p:blipFill>
+        <p:spPr>
+          <a:xfrm>
+            <a:off x="0" y="228441"/>
+            <a:ext cx="12192000" cy="6401118"/>
+          </a:xfrm>
+          <a:prstGeom prst="rect">
+            <a:avLst/>
+          </a:prstGeom>
+        </p:spPr>
+      </p:pic>
+      <p:sp>
+        <p:nvSpPr>
+          <p:cNvPr id="6" name="Rectangle 5">
+            <a:extLst>
+              <a:ext uri="{FF2B5EF4-FFF2-40B4-BE49-F238E27FC236}">
+                <a16:creationId xmlns:a16="http://schemas.microsoft.com/office/drawing/2014/main" id="{BF360145-89E0-4819-B96F-FE70FCAB1D6A}"/>
+              </a:ext>
+            </a:extLst>
+          </p:cNvPr>
+          <p:cNvSpPr/>
+          <p:nvPr/>
+        </p:nvSpPr>
+        <p:spPr>
+          <a:xfrm>
+            <a:off x="1737743" y="1352551"/>
+            <a:ext cx="4977381" cy="461010"/>
+          </a:xfrm>
+          <a:prstGeom prst="rect">
+            <a:avLst/>
+          </a:prstGeom>
+          <a:noFill/>
+          <a:ln w="38100">
+            <a:solidFill>
+              <a:srgbClr val="FF0000"/>
+            </a:solidFill>
+          </a:ln>
+        </p:spPr>
+        <p:style>
+          <a:lnRef idx="2">
+            <a:schemeClr val="accent1">
+              <a:shade val="50000"/>
+            </a:schemeClr>
+          </a:lnRef>
+          <a:fillRef idx="1">
+            <a:schemeClr val="accent1"/>
+          </a:fillRef>
+          <a:effectRef idx="0">
+            <a:schemeClr val="accent1"/>
+          </a:effectRef>
+          <a:fontRef idx="minor">
+            <a:schemeClr val="lt1"/>
+          </a:fontRef>
+        </p:style>
+        <p:txBody>
+          <a:bodyPr rtlCol="0" anchor="ctr"/>
+          <a:lstStyle/>
+          <a:p>
+            <a:pPr algn="ctr"/>
+            <a:endParaRPr lang="en-SG" dirty="0"/>
+          </a:p>
+        </p:txBody>
+      </p:sp>
+      <p:sp>
+        <p:nvSpPr>
+          <p:cNvPr id="7" name="Rectangle 6">
+            <a:extLst>
+              <a:ext uri="{FF2B5EF4-FFF2-40B4-BE49-F238E27FC236}">
+                <a16:creationId xmlns:a16="http://schemas.microsoft.com/office/drawing/2014/main" id="{837E0D91-67AC-4356-A21E-27B1C025CBB0}"/>
+              </a:ext>
+            </a:extLst>
+          </p:cNvPr>
+          <p:cNvSpPr/>
+          <p:nvPr/>
+        </p:nvSpPr>
+        <p:spPr>
+          <a:xfrm>
+            <a:off x="1737742" y="1809750"/>
+            <a:ext cx="4977381" cy="529589"/>
+          </a:xfrm>
+          <a:prstGeom prst="rect">
+            <a:avLst/>
+          </a:prstGeom>
+          <a:noFill/>
+          <a:ln w="38100">
+            <a:solidFill>
+              <a:srgbClr val="FF0000"/>
+            </a:solidFill>
+          </a:ln>
+        </p:spPr>
+        <p:style>
+          <a:lnRef idx="2">
+            <a:schemeClr val="accent1">
+              <a:shade val="50000"/>
+            </a:schemeClr>
+          </a:lnRef>
+          <a:fillRef idx="1">
+            <a:schemeClr val="accent1"/>
+          </a:fillRef>
+          <a:effectRef idx="0">
+            <a:schemeClr val="accent1"/>
+          </a:effectRef>
+          <a:fontRef idx="minor">
+            <a:schemeClr val="lt1"/>
+          </a:fontRef>
+        </p:style>
+        <p:txBody>
+          <a:bodyPr rtlCol="0" anchor="ctr"/>
+          <a:lstStyle/>
+          <a:p>
+            <a:pPr algn="ctr"/>
+            <a:endParaRPr lang="en-SG" dirty="0"/>
+          </a:p>
+        </p:txBody>
+      </p:sp>
+      <p:sp>
+        <p:nvSpPr>
+          <p:cNvPr id="8" name="Rectangle 7">
+            <a:extLst>
+              <a:ext uri="{FF2B5EF4-FFF2-40B4-BE49-F238E27FC236}">
+                <a16:creationId xmlns:a16="http://schemas.microsoft.com/office/drawing/2014/main" id="{212C3D47-9E77-4D95-8F4F-B2760874748E}"/>
+              </a:ext>
+            </a:extLst>
+          </p:cNvPr>
+          <p:cNvSpPr/>
+          <p:nvPr/>
+        </p:nvSpPr>
+        <p:spPr>
+          <a:xfrm>
+            <a:off x="1737742" y="2339339"/>
+            <a:ext cx="4977381" cy="495300"/>
+          </a:xfrm>
+          <a:prstGeom prst="rect">
+            <a:avLst/>
+          </a:prstGeom>
+          <a:noFill/>
+          <a:ln w="38100">
+            <a:solidFill>
+              <a:srgbClr val="FF0000"/>
+            </a:solidFill>
+          </a:ln>
+        </p:spPr>
+        <p:style>
+          <a:lnRef idx="2">
+            <a:schemeClr val="accent1">
+              <a:shade val="50000"/>
+            </a:schemeClr>
+          </a:lnRef>
+          <a:fillRef idx="1">
+            <a:schemeClr val="accent1"/>
+          </a:fillRef>
+          <a:effectRef idx="0">
+            <a:schemeClr val="accent1"/>
+          </a:effectRef>
+          <a:fontRef idx="minor">
+            <a:schemeClr val="lt1"/>
+          </a:fontRef>
+        </p:style>
+        <p:txBody>
+          <a:bodyPr rtlCol="0" anchor="ctr"/>
+          <a:lstStyle/>
+          <a:p>
+            <a:pPr algn="ctr"/>
+            <a:endParaRPr lang="en-SG" dirty="0"/>
+          </a:p>
+        </p:txBody>
+      </p:sp>
+      <p:sp>
+        <p:nvSpPr>
+          <p:cNvPr id="9" name="Rectangle 8">
+            <a:extLst>
+              <a:ext uri="{FF2B5EF4-FFF2-40B4-BE49-F238E27FC236}">
+                <a16:creationId xmlns:a16="http://schemas.microsoft.com/office/drawing/2014/main" id="{674643C9-56FD-4A41-BC4C-34D19C462212}"/>
+              </a:ext>
+            </a:extLst>
+          </p:cNvPr>
+          <p:cNvSpPr/>
+          <p:nvPr/>
+        </p:nvSpPr>
+        <p:spPr>
+          <a:xfrm>
+            <a:off x="1737742" y="2834801"/>
+            <a:ext cx="4977381" cy="495300"/>
+          </a:xfrm>
+          <a:prstGeom prst="rect">
+            <a:avLst/>
+          </a:prstGeom>
+          <a:noFill/>
+          <a:ln w="38100">
+            <a:solidFill>
+              <a:srgbClr val="FF0000"/>
+            </a:solidFill>
+          </a:ln>
+        </p:spPr>
+        <p:style>
+          <a:lnRef idx="2">
+            <a:schemeClr val="accent1">
+              <a:shade val="50000"/>
+            </a:schemeClr>
+          </a:lnRef>
+          <a:fillRef idx="1">
+            <a:schemeClr val="accent1"/>
+          </a:fillRef>
+          <a:effectRef idx="0">
+            <a:schemeClr val="accent1"/>
+          </a:effectRef>
+          <a:fontRef idx="minor">
+            <a:schemeClr val="lt1"/>
+          </a:fontRef>
+        </p:style>
+        <p:txBody>
+          <a:bodyPr rtlCol="0" anchor="ctr"/>
+          <a:lstStyle/>
+          <a:p>
+            <a:pPr algn="ctr"/>
+            <a:endParaRPr lang="en-SG" dirty="0"/>
+          </a:p>
+        </p:txBody>
+      </p:sp>
+      <p:pic>
+        <p:nvPicPr>
+          <p:cNvPr id="11" name="Picture 10">
+            <a:extLst>
+              <a:ext uri="{FF2B5EF4-FFF2-40B4-BE49-F238E27FC236}">
+                <a16:creationId xmlns:a16="http://schemas.microsoft.com/office/drawing/2014/main" id="{0BE553DA-72B5-409F-B896-D0502AEBA861}"/>
+              </a:ext>
+            </a:extLst>
+          </p:cNvPr>
+          <p:cNvPicPr>
+            <a:picLocks noChangeAspect="1"/>
+          </p:cNvPicPr>
+          <p:nvPr/>
+        </p:nvPicPr>
+        <p:blipFill>
+          <a:blip r:embed="rId3"/>
+          <a:stretch>
+            <a:fillRect/>
+          </a:stretch>
+        </p:blipFill>
+        <p:spPr>
+          <a:xfrm>
+            <a:off x="7898864" y="319099"/>
+            <a:ext cx="4119043" cy="1490651"/>
+          </a:xfrm>
+          <a:prstGeom prst="rect">
+            <a:avLst/>
+          </a:prstGeom>
+        </p:spPr>
+      </p:pic>
+      <p:pic>
+        <p:nvPicPr>
+          <p:cNvPr id="13" name="Picture 12">
+            <a:extLst>
+              <a:ext uri="{FF2B5EF4-FFF2-40B4-BE49-F238E27FC236}">
+                <a16:creationId xmlns:a16="http://schemas.microsoft.com/office/drawing/2014/main" id="{67374A2F-31E3-46DF-9761-6728AA1E03F9}"/>
+              </a:ext>
+            </a:extLst>
+          </p:cNvPr>
+          <p:cNvPicPr>
+            <a:picLocks noChangeAspect="1"/>
+          </p:cNvPicPr>
+          <p:nvPr/>
+        </p:nvPicPr>
+        <p:blipFill>
+          <a:blip r:embed="rId4"/>
+          <a:stretch>
+            <a:fillRect/>
+          </a:stretch>
+        </p:blipFill>
+        <p:spPr>
+          <a:xfrm>
+            <a:off x="7898864" y="1929876"/>
+            <a:ext cx="4048642" cy="1415464"/>
+          </a:xfrm>
+          <a:prstGeom prst="rect">
+            <a:avLst/>
+          </a:prstGeom>
+        </p:spPr>
+      </p:pic>
+      <p:cxnSp>
+        <p:nvCxnSpPr>
+          <p:cNvPr id="14" name="Straight Arrow Connector 13">
+            <a:extLst>
+              <a:ext uri="{FF2B5EF4-FFF2-40B4-BE49-F238E27FC236}">
+                <a16:creationId xmlns:a16="http://schemas.microsoft.com/office/drawing/2014/main" id="{779D8118-5BBD-4C6C-A103-5EB4C818E2E9}"/>
+              </a:ext>
+            </a:extLst>
+          </p:cNvPr>
+          <p:cNvCxnSpPr>
+            <a:cxnSpLocks/>
+            <a:stCxn id="6" idx="3"/>
+            <a:endCxn id="11" idx="1"/>
+          </p:cNvCxnSpPr>
+          <p:nvPr/>
+        </p:nvCxnSpPr>
+        <p:spPr>
+          <a:xfrm flipV="1">
+            <a:off x="6715124" y="1064425"/>
+            <a:ext cx="1183740" cy="518631"/>
+          </a:xfrm>
+          <a:prstGeom prst="straightConnector1">
+            <a:avLst/>
+          </a:prstGeom>
+          <a:ln w="28575">
+            <a:solidFill>
+              <a:srgbClr val="FF0000"/>
+            </a:solidFill>
+            <a:tailEnd type="triangle"/>
+          </a:ln>
+        </p:spPr>
+        <p:style>
+          <a:lnRef idx="1">
+            <a:schemeClr val="accent1"/>
+          </a:lnRef>
+          <a:fillRef idx="0">
+            <a:schemeClr val="accent1"/>
+          </a:fillRef>
+          <a:effectRef idx="0">
+            <a:schemeClr val="accent1"/>
+          </a:effectRef>
+          <a:fontRef idx="minor">
+            <a:schemeClr val="tx1"/>
+          </a:fontRef>
+        </p:style>
+      </p:cxnSp>
+      <p:cxnSp>
+        <p:nvCxnSpPr>
+          <p:cNvPr id="15" name="Straight Arrow Connector 14">
+            <a:extLst>
+              <a:ext uri="{FF2B5EF4-FFF2-40B4-BE49-F238E27FC236}">
+                <a16:creationId xmlns:a16="http://schemas.microsoft.com/office/drawing/2014/main" id="{FE4D7E24-1857-46B2-A892-EED5C8F28489}"/>
+              </a:ext>
+            </a:extLst>
+          </p:cNvPr>
+          <p:cNvCxnSpPr>
+            <a:cxnSpLocks/>
+            <a:stCxn id="7" idx="3"/>
+            <a:endCxn id="13" idx="1"/>
+          </p:cNvCxnSpPr>
+          <p:nvPr/>
+        </p:nvCxnSpPr>
+        <p:spPr>
+          <a:xfrm>
+            <a:off x="6715123" y="2074545"/>
+            <a:ext cx="1183741" cy="563063"/>
+          </a:xfrm>
+          <a:prstGeom prst="straightConnector1">
+            <a:avLst/>
+          </a:prstGeom>
+          <a:ln w="28575">
+            <a:solidFill>
+              <a:srgbClr val="FF0000"/>
+            </a:solidFill>
+            <a:tailEnd type="triangle"/>
+          </a:ln>
+        </p:spPr>
+        <p:style>
+          <a:lnRef idx="1">
+            <a:schemeClr val="accent1"/>
+          </a:lnRef>
+          <a:fillRef idx="0">
+            <a:schemeClr val="accent1"/>
+          </a:fillRef>
+          <a:effectRef idx="0">
+            <a:schemeClr val="accent1"/>
+          </a:effectRef>
+          <a:fontRef idx="minor">
+            <a:schemeClr val="tx1"/>
+          </a:fontRef>
+        </p:style>
+      </p:cxnSp>
+      <p:sp>
+        <p:nvSpPr>
+          <p:cNvPr id="20" name="Oval 19">
+            <a:extLst>
+              <a:ext uri="{FF2B5EF4-FFF2-40B4-BE49-F238E27FC236}">
+                <a16:creationId xmlns:a16="http://schemas.microsoft.com/office/drawing/2014/main" id="{74E94F76-FCEC-4EF5-9F0D-C8F1753FB78C}"/>
+              </a:ext>
+            </a:extLst>
+          </p:cNvPr>
+          <p:cNvSpPr/>
+          <p:nvPr/>
+        </p:nvSpPr>
+        <p:spPr>
+          <a:xfrm>
+            <a:off x="1343180" y="1411312"/>
+            <a:ext cx="220470" cy="211750"/>
+          </a:xfrm>
+          <a:prstGeom prst="ellipse">
+            <a:avLst/>
+          </a:prstGeom>
+          <a:solidFill>
+            <a:schemeClr val="bg1"/>
+          </a:solidFill>
+          <a:ln w="12700">
+            <a:solidFill>
+              <a:schemeClr val="tx2"/>
+            </a:solidFill>
+          </a:ln>
+        </p:spPr>
+        <p:style>
+          <a:lnRef idx="2">
+            <a:schemeClr val="accent1">
+              <a:shade val="50000"/>
+            </a:schemeClr>
+          </a:lnRef>
+          <a:fillRef idx="1">
+            <a:schemeClr val="accent1"/>
+          </a:fillRef>
+          <a:effectRef idx="0">
+            <a:schemeClr val="accent1"/>
+          </a:effectRef>
+          <a:fontRef idx="minor">
+            <a:schemeClr val="lt1"/>
+          </a:fontRef>
+        </p:style>
+        <p:txBody>
+          <a:bodyPr rtlCol="0" anchor="ctr"/>
+          <a:lstStyle/>
+          <a:p>
+            <a:pPr algn="ctr"/>
+            <a:r>
+              <a:rPr lang="en-SG" sz="1600" dirty="0">
+                <a:solidFill>
+                  <a:schemeClr val="tx2"/>
+                </a:solidFill>
+              </a:rPr>
+              <a:t>1</a:t>
+            </a:r>
+          </a:p>
+        </p:txBody>
+      </p:sp>
+      <p:sp>
+        <p:nvSpPr>
+          <p:cNvPr id="21" name="Oval 20">
+            <a:extLst>
+              <a:ext uri="{FF2B5EF4-FFF2-40B4-BE49-F238E27FC236}">
+                <a16:creationId xmlns:a16="http://schemas.microsoft.com/office/drawing/2014/main" id="{B1B09842-E2B4-4F0F-A3F5-E36B623598FD}"/>
+              </a:ext>
+            </a:extLst>
+          </p:cNvPr>
+          <p:cNvSpPr/>
+          <p:nvPr/>
+        </p:nvSpPr>
+        <p:spPr>
+          <a:xfrm>
+            <a:off x="7678394" y="558206"/>
+            <a:ext cx="220470" cy="211750"/>
+          </a:xfrm>
+          <a:prstGeom prst="ellipse">
+            <a:avLst/>
+          </a:prstGeom>
+          <a:solidFill>
+            <a:schemeClr val="bg1"/>
+          </a:solidFill>
+          <a:ln w="12700">
+            <a:solidFill>
+              <a:schemeClr val="tx2"/>
+            </a:solidFill>
+          </a:ln>
+        </p:spPr>
+        <p:style>
+          <a:lnRef idx="2">
+            <a:schemeClr val="accent1">
+              <a:shade val="50000"/>
+            </a:schemeClr>
+          </a:lnRef>
+          <a:fillRef idx="1">
+            <a:schemeClr val="accent1"/>
+          </a:fillRef>
+          <a:effectRef idx="0">
+            <a:schemeClr val="accent1"/>
+          </a:effectRef>
+          <a:fontRef idx="minor">
+            <a:schemeClr val="lt1"/>
+          </a:fontRef>
+        </p:style>
+        <p:txBody>
+          <a:bodyPr rtlCol="0" anchor="ctr"/>
+          <a:lstStyle/>
+          <a:p>
+            <a:pPr algn="ctr"/>
+            <a:r>
+              <a:rPr lang="en-SG" sz="1600" dirty="0">
+                <a:solidFill>
+                  <a:schemeClr val="tx2"/>
+                </a:solidFill>
+              </a:rPr>
+              <a:t>2</a:t>
+            </a:r>
+          </a:p>
+        </p:txBody>
+      </p:sp>
+      <p:sp>
+        <p:nvSpPr>
+          <p:cNvPr id="22" name="Oval 21">
+            <a:extLst>
+              <a:ext uri="{FF2B5EF4-FFF2-40B4-BE49-F238E27FC236}">
+                <a16:creationId xmlns:a16="http://schemas.microsoft.com/office/drawing/2014/main" id="{FBBFA7F7-3154-4532-A68F-EFD20FCD970D}"/>
+              </a:ext>
+            </a:extLst>
+          </p:cNvPr>
+          <p:cNvSpPr/>
+          <p:nvPr/>
+        </p:nvSpPr>
+        <p:spPr>
+          <a:xfrm>
+            <a:off x="7661983" y="1968669"/>
+            <a:ext cx="220470" cy="211750"/>
+          </a:xfrm>
+          <a:prstGeom prst="ellipse">
+            <a:avLst/>
+          </a:prstGeom>
+          <a:solidFill>
+            <a:schemeClr val="bg1"/>
+          </a:solidFill>
+          <a:ln w="12700">
+            <a:solidFill>
+              <a:schemeClr val="tx2"/>
+            </a:solidFill>
+          </a:ln>
+        </p:spPr>
+        <p:style>
+          <a:lnRef idx="2">
+            <a:schemeClr val="accent1">
+              <a:shade val="50000"/>
+            </a:schemeClr>
+          </a:lnRef>
+          <a:fillRef idx="1">
+            <a:schemeClr val="accent1"/>
+          </a:fillRef>
+          <a:effectRef idx="0">
+            <a:schemeClr val="accent1"/>
+          </a:effectRef>
+          <a:fontRef idx="minor">
+            <a:schemeClr val="lt1"/>
+          </a:fontRef>
+        </p:style>
+        <p:txBody>
+          <a:bodyPr rtlCol="0" anchor="ctr"/>
+          <a:lstStyle/>
+          <a:p>
+            <a:pPr algn="ctr"/>
+            <a:r>
+              <a:rPr lang="en-SG" sz="1600" dirty="0">
+                <a:solidFill>
+                  <a:schemeClr val="tx2"/>
+                </a:solidFill>
+              </a:rPr>
+              <a:t>3</a:t>
+            </a:r>
+          </a:p>
+        </p:txBody>
+      </p:sp>
+      <p:sp>
+        <p:nvSpPr>
+          <p:cNvPr id="23" name="Oval 22">
+            <a:extLst>
+              <a:ext uri="{FF2B5EF4-FFF2-40B4-BE49-F238E27FC236}">
+                <a16:creationId xmlns:a16="http://schemas.microsoft.com/office/drawing/2014/main" id="{02D120E9-F7CE-422F-9C06-6CB9038651CE}"/>
+              </a:ext>
+            </a:extLst>
+          </p:cNvPr>
+          <p:cNvSpPr/>
+          <p:nvPr/>
+        </p:nvSpPr>
+        <p:spPr>
+          <a:xfrm>
+            <a:off x="6776081" y="2497958"/>
+            <a:ext cx="220470" cy="211750"/>
+          </a:xfrm>
+          <a:prstGeom prst="ellipse">
+            <a:avLst/>
+          </a:prstGeom>
+          <a:solidFill>
+            <a:schemeClr val="bg1"/>
+          </a:solidFill>
+          <a:ln w="12700">
+            <a:solidFill>
+              <a:schemeClr val="tx2"/>
+            </a:solidFill>
+          </a:ln>
+        </p:spPr>
+        <p:style>
+          <a:lnRef idx="2">
+            <a:schemeClr val="accent1">
+              <a:shade val="50000"/>
+            </a:schemeClr>
+          </a:lnRef>
+          <a:fillRef idx="1">
+            <a:schemeClr val="accent1"/>
+          </a:fillRef>
+          <a:effectRef idx="0">
+            <a:schemeClr val="accent1"/>
+          </a:effectRef>
+          <a:fontRef idx="minor">
+            <a:schemeClr val="lt1"/>
+          </a:fontRef>
+        </p:style>
+        <p:txBody>
+          <a:bodyPr rtlCol="0" anchor="ctr"/>
+          <a:lstStyle/>
+          <a:p>
+            <a:pPr algn="ctr"/>
+            <a:r>
+              <a:rPr lang="en-SG" sz="1600" dirty="0">
+                <a:solidFill>
+                  <a:schemeClr val="tx2"/>
+                </a:solidFill>
+              </a:rPr>
+              <a:t>4</a:t>
+            </a:r>
+          </a:p>
+        </p:txBody>
+      </p:sp>
+      <p:sp>
+        <p:nvSpPr>
+          <p:cNvPr id="24" name="Oval 23">
+            <a:extLst>
+              <a:ext uri="{FF2B5EF4-FFF2-40B4-BE49-F238E27FC236}">
+                <a16:creationId xmlns:a16="http://schemas.microsoft.com/office/drawing/2014/main" id="{BA852EF5-AB21-43D6-B333-0D1AC1631B4C}"/>
+              </a:ext>
+            </a:extLst>
+          </p:cNvPr>
+          <p:cNvSpPr/>
+          <p:nvPr/>
+        </p:nvSpPr>
+        <p:spPr>
+          <a:xfrm>
+            <a:off x="6776081" y="2993558"/>
+            <a:ext cx="220470" cy="211750"/>
+          </a:xfrm>
+          <a:prstGeom prst="ellipse">
+            <a:avLst/>
+          </a:prstGeom>
+          <a:solidFill>
+            <a:schemeClr val="bg1"/>
+          </a:solidFill>
+          <a:ln w="12700">
+            <a:solidFill>
+              <a:schemeClr val="tx2"/>
+            </a:solidFill>
+          </a:ln>
+        </p:spPr>
+        <p:style>
+          <a:lnRef idx="2">
+            <a:schemeClr val="accent1">
+              <a:shade val="50000"/>
+            </a:schemeClr>
+          </a:lnRef>
+          <a:fillRef idx="1">
+            <a:schemeClr val="accent1"/>
+          </a:fillRef>
+          <a:effectRef idx="0">
+            <a:schemeClr val="accent1"/>
+          </a:effectRef>
+          <a:fontRef idx="minor">
+            <a:schemeClr val="lt1"/>
+          </a:fontRef>
+        </p:style>
+        <p:txBody>
+          <a:bodyPr rtlCol="0" anchor="ctr"/>
+          <a:lstStyle/>
+          <a:p>
+            <a:pPr algn="ctr"/>
+            <a:r>
+              <a:rPr lang="en-SG" sz="1600" dirty="0">
+                <a:solidFill>
+                  <a:schemeClr val="tx2"/>
+                </a:solidFill>
+              </a:rPr>
+              <a:t>5</a:t>
+            </a:r>
+          </a:p>
+        </p:txBody>
+      </p:sp>
+    </p:spTree>
+    <p:extLst>
+      <p:ext uri="{BB962C8B-B14F-4D97-AF65-F5344CB8AC3E}">
+        <p14:creationId xmlns:p14="http://schemas.microsoft.com/office/powerpoint/2010/main" val="2763304473"/>
+      </p:ext>
+    </p:extLst>
+  </p:cSld>
+  <p:clrMapOvr>
+    <a:masterClrMapping/>
+  </p:clrMapOvr>
+</p:sld>
+</file>
+
+<file path=ppt/slides/slide5.xml><?xml version="1.0" encoding="utf-8"?>
 <p:sld xmlns:a="http://schemas.openxmlformats.org/drawingml/2006/main" xmlns:r="http://schemas.openxmlformats.org/officeDocument/2006/relationships" xmlns:p="http://schemas.openxmlformats.org/presentationml/2006/main">
   <p:cSld>
     <p:spTree>
@@ -4597,7 +5822,7 @@
 </p:sld>
 </file>
 
-<file path=ppt/slides/slide4.xml><?xml version="1.0" encoding="utf-8"?>
+<file path=ppt/slides/slide6.xml><?xml version="1.0" encoding="utf-8"?>
 <p:sld xmlns:a="http://schemas.openxmlformats.org/drawingml/2006/main" xmlns:r="http://schemas.openxmlformats.org/officeDocument/2006/relationships" xmlns:p="http://schemas.openxmlformats.org/presentationml/2006/main">
   <p:cSld>
     <p:spTree>

</xml_diff>

<commit_message>
Updates to User Guide.
</commit_message>
<xml_diff>
--- a/UserGuide/images/imagecreator.pptx
+++ b/UserGuide/images/imagecreator.pptx
@@ -5,12 +5,10 @@
     <p:sldMasterId id="2147483648" r:id="rId1"/>
   </p:sldMasterIdLst>
   <p:sldIdLst>
-    <p:sldId id="256" r:id="rId2"/>
-    <p:sldId id="260" r:id="rId3"/>
-    <p:sldId id="257" r:id="rId4"/>
-    <p:sldId id="261" r:id="rId5"/>
-    <p:sldId id="258" r:id="rId6"/>
-    <p:sldId id="259" r:id="rId7"/>
+    <p:sldId id="260" r:id="rId2"/>
+    <p:sldId id="261" r:id="rId3"/>
+    <p:sldId id="258" r:id="rId4"/>
+    <p:sldId id="259" r:id="rId5"/>
   </p:sldIdLst>
   <p:sldSz cx="12192000" cy="6858000"/>
   <p:notesSz cx="6858000" cy="9144000"/>
@@ -3354,170 +3352,6 @@
       </p:grpSpPr>
       <p:pic>
         <p:nvPicPr>
-          <p:cNvPr id="5" name="Picture 4">
-            <a:extLst>
-              <a:ext uri="{FF2B5EF4-FFF2-40B4-BE49-F238E27FC236}">
-                <a16:creationId xmlns:a16="http://schemas.microsoft.com/office/drawing/2014/main" id="{AF3DAC82-AF5A-4C0B-88C6-AEE15F091C5B}"/>
-              </a:ext>
-            </a:extLst>
-          </p:cNvPr>
-          <p:cNvPicPr>
-            <a:picLocks noChangeAspect="1"/>
-          </p:cNvPicPr>
-          <p:nvPr/>
-        </p:nvPicPr>
-        <p:blipFill>
-          <a:blip r:embed="rId2"/>
-          <a:stretch>
-            <a:fillRect/>
-          </a:stretch>
-        </p:blipFill>
-        <p:spPr>
-          <a:xfrm>
-            <a:off x="3538211" y="0"/>
-            <a:ext cx="5115577" cy="6858000"/>
-          </a:xfrm>
-          <a:prstGeom prst="rect">
-            <a:avLst/>
-          </a:prstGeom>
-        </p:spPr>
-      </p:pic>
-      <p:sp>
-        <p:nvSpPr>
-          <p:cNvPr id="6" name="Rectangle 5">
-            <a:extLst>
-              <a:ext uri="{FF2B5EF4-FFF2-40B4-BE49-F238E27FC236}">
-                <a16:creationId xmlns:a16="http://schemas.microsoft.com/office/drawing/2014/main" id="{2436B9C8-5ED5-4750-9076-DAEC031527A9}"/>
-              </a:ext>
-            </a:extLst>
-          </p:cNvPr>
-          <p:cNvSpPr/>
-          <p:nvPr/>
-        </p:nvSpPr>
-        <p:spPr>
-          <a:xfrm>
-            <a:off x="3884017" y="951979"/>
-            <a:ext cx="2105722" cy="566428"/>
-          </a:xfrm>
-          <a:prstGeom prst="rect">
-            <a:avLst/>
-          </a:prstGeom>
-          <a:noFill/>
-          <a:ln w="38100">
-            <a:solidFill>
-              <a:srgbClr val="FF0000"/>
-            </a:solidFill>
-          </a:ln>
-        </p:spPr>
-        <p:style>
-          <a:lnRef idx="2">
-            <a:schemeClr val="accent1">
-              <a:shade val="50000"/>
-            </a:schemeClr>
-          </a:lnRef>
-          <a:fillRef idx="1">
-            <a:schemeClr val="accent1"/>
-          </a:fillRef>
-          <a:effectRef idx="0">
-            <a:schemeClr val="accent1"/>
-          </a:effectRef>
-          <a:fontRef idx="minor">
-            <a:schemeClr val="lt1"/>
-          </a:fontRef>
-        </p:style>
-        <p:txBody>
-          <a:bodyPr rtlCol="0" anchor="ctr"/>
-          <a:lstStyle/>
-          <a:p>
-            <a:pPr algn="ctr"/>
-            <a:endParaRPr lang="en-SG" dirty="0"/>
-          </a:p>
-        </p:txBody>
-      </p:sp>
-      <p:sp>
-        <p:nvSpPr>
-          <p:cNvPr id="7" name="Rectangle 6">
-            <a:extLst>
-              <a:ext uri="{FF2B5EF4-FFF2-40B4-BE49-F238E27FC236}">
-                <a16:creationId xmlns:a16="http://schemas.microsoft.com/office/drawing/2014/main" id="{70857BCF-2F26-4430-A62E-F00D4F76E6C2}"/>
-              </a:ext>
-            </a:extLst>
-          </p:cNvPr>
-          <p:cNvSpPr/>
-          <p:nvPr/>
-        </p:nvSpPr>
-        <p:spPr>
-          <a:xfrm>
-            <a:off x="3884017" y="1528194"/>
-            <a:ext cx="2105722" cy="566428"/>
-          </a:xfrm>
-          <a:prstGeom prst="rect">
-            <a:avLst/>
-          </a:prstGeom>
-          <a:noFill/>
-          <a:ln w="38100">
-            <a:solidFill>
-              <a:srgbClr val="FF0000"/>
-            </a:solidFill>
-          </a:ln>
-        </p:spPr>
-        <p:style>
-          <a:lnRef idx="2">
-            <a:schemeClr val="accent1">
-              <a:shade val="50000"/>
-            </a:schemeClr>
-          </a:lnRef>
-          <a:fillRef idx="1">
-            <a:schemeClr val="accent1"/>
-          </a:fillRef>
-          <a:effectRef idx="0">
-            <a:schemeClr val="accent1"/>
-          </a:effectRef>
-          <a:fontRef idx="minor">
-            <a:schemeClr val="lt1"/>
-          </a:fontRef>
-        </p:style>
-        <p:txBody>
-          <a:bodyPr rtlCol="0" anchor="ctr"/>
-          <a:lstStyle/>
-          <a:p>
-            <a:pPr algn="ctr"/>
-            <a:endParaRPr lang="en-SG" dirty="0"/>
-          </a:p>
-        </p:txBody>
-      </p:sp>
-    </p:spTree>
-    <p:extLst>
-      <p:ext uri="{BB962C8B-B14F-4D97-AF65-F5344CB8AC3E}">
-        <p14:creationId xmlns:p14="http://schemas.microsoft.com/office/powerpoint/2010/main" val="1840759689"/>
-      </p:ext>
-    </p:extLst>
-  </p:cSld>
-  <p:clrMapOvr>
-    <a:masterClrMapping/>
-  </p:clrMapOvr>
-</p:sld>
-</file>
-
-<file path=ppt/slides/slide2.xml><?xml version="1.0" encoding="utf-8"?>
-<p:sld xmlns:a="http://schemas.openxmlformats.org/drawingml/2006/main" xmlns:r="http://schemas.openxmlformats.org/officeDocument/2006/relationships" xmlns:p="http://schemas.openxmlformats.org/presentationml/2006/main">
-  <p:cSld>
-    <p:spTree>
-      <p:nvGrpSpPr>
-        <p:cNvPr id="1" name=""/>
-        <p:cNvGrpSpPr/>
-        <p:nvPr/>
-      </p:nvGrpSpPr>
-      <p:grpSpPr>
-        <a:xfrm>
-          <a:off x="0" y="0"/>
-          <a:ext cx="0" cy="0"/>
-          <a:chOff x="0" y="0"/>
-          <a:chExt cx="0" cy="0"/>
-        </a:xfrm>
-      </p:grpSpPr>
-      <p:pic>
-        <p:nvPicPr>
           <p:cNvPr id="13" name="Picture 12">
             <a:extLst>
               <a:ext uri="{FF2B5EF4-FFF2-40B4-BE49-F238E27FC236}">
@@ -3997,275 +3831,7 @@
 </p:sld>
 </file>
 
-<file path=ppt/slides/slide3.xml><?xml version="1.0" encoding="utf-8"?>
-<p:sld xmlns:a="http://schemas.openxmlformats.org/drawingml/2006/main" xmlns:r="http://schemas.openxmlformats.org/officeDocument/2006/relationships" xmlns:p="http://schemas.openxmlformats.org/presentationml/2006/main">
-  <p:cSld>
-    <p:spTree>
-      <p:nvGrpSpPr>
-        <p:cNvPr id="1" name=""/>
-        <p:cNvGrpSpPr/>
-        <p:nvPr/>
-      </p:nvGrpSpPr>
-      <p:grpSpPr>
-        <a:xfrm>
-          <a:off x="0" y="0"/>
-          <a:ext cx="0" cy="0"/>
-          <a:chOff x="0" y="0"/>
-          <a:chExt cx="0" cy="0"/>
-        </a:xfrm>
-      </p:grpSpPr>
-      <p:pic>
-        <p:nvPicPr>
-          <p:cNvPr id="5" name="Picture 4">
-            <a:extLst>
-              <a:ext uri="{FF2B5EF4-FFF2-40B4-BE49-F238E27FC236}">
-                <a16:creationId xmlns:a16="http://schemas.microsoft.com/office/drawing/2014/main" id="{226426FD-04C8-420D-8D19-D0A03AAD2C81}"/>
-              </a:ext>
-            </a:extLst>
-          </p:cNvPr>
-          <p:cNvPicPr>
-            <a:picLocks noChangeAspect="1"/>
-          </p:cNvPicPr>
-          <p:nvPr/>
-        </p:nvPicPr>
-        <p:blipFill>
-          <a:blip r:embed="rId2"/>
-          <a:stretch>
-            <a:fillRect/>
-          </a:stretch>
-        </p:blipFill>
-        <p:spPr>
-          <a:xfrm>
-            <a:off x="3735456" y="0"/>
-            <a:ext cx="4721087" cy="6858000"/>
-          </a:xfrm>
-          <a:prstGeom prst="rect">
-            <a:avLst/>
-          </a:prstGeom>
-        </p:spPr>
-      </p:pic>
-      <p:sp>
-        <p:nvSpPr>
-          <p:cNvPr id="6" name="Rectangle 5">
-            <a:extLst>
-              <a:ext uri="{FF2B5EF4-FFF2-40B4-BE49-F238E27FC236}">
-                <a16:creationId xmlns:a16="http://schemas.microsoft.com/office/drawing/2014/main" id="{82295A71-DD57-4ED8-B159-1E9493778364}"/>
-              </a:ext>
-            </a:extLst>
-          </p:cNvPr>
-          <p:cNvSpPr/>
-          <p:nvPr/>
-        </p:nvSpPr>
-        <p:spPr>
-          <a:xfrm>
-            <a:off x="4061299" y="893713"/>
-            <a:ext cx="1966277" cy="566428"/>
-          </a:xfrm>
-          <a:prstGeom prst="rect">
-            <a:avLst/>
-          </a:prstGeom>
-          <a:noFill/>
-          <a:ln w="38100">
-            <a:solidFill>
-              <a:srgbClr val="FF0000"/>
-            </a:solidFill>
-          </a:ln>
-        </p:spPr>
-        <p:style>
-          <a:lnRef idx="2">
-            <a:schemeClr val="accent1">
-              <a:shade val="50000"/>
-            </a:schemeClr>
-          </a:lnRef>
-          <a:fillRef idx="1">
-            <a:schemeClr val="accent1"/>
-          </a:fillRef>
-          <a:effectRef idx="0">
-            <a:schemeClr val="accent1"/>
-          </a:effectRef>
-          <a:fontRef idx="minor">
-            <a:schemeClr val="lt1"/>
-          </a:fontRef>
-        </p:style>
-        <p:txBody>
-          <a:bodyPr rtlCol="0" anchor="ctr"/>
-          <a:lstStyle/>
-          <a:p>
-            <a:pPr algn="ctr"/>
-            <a:endParaRPr lang="en-SG" dirty="0"/>
-          </a:p>
-        </p:txBody>
-      </p:sp>
-      <p:sp>
-        <p:nvSpPr>
-          <p:cNvPr id="7" name="Rectangle 6">
-            <a:extLst>
-              <a:ext uri="{FF2B5EF4-FFF2-40B4-BE49-F238E27FC236}">
-                <a16:creationId xmlns:a16="http://schemas.microsoft.com/office/drawing/2014/main" id="{12B72121-F753-455E-943A-CBBEC3E60734}"/>
-              </a:ext>
-            </a:extLst>
-          </p:cNvPr>
-          <p:cNvSpPr/>
-          <p:nvPr/>
-        </p:nvSpPr>
-        <p:spPr>
-          <a:xfrm>
-            <a:off x="4061493" y="1460141"/>
-            <a:ext cx="1966277" cy="566428"/>
-          </a:xfrm>
-          <a:prstGeom prst="rect">
-            <a:avLst/>
-          </a:prstGeom>
-          <a:noFill/>
-          <a:ln w="38100">
-            <a:solidFill>
-              <a:srgbClr val="FF0000"/>
-            </a:solidFill>
-          </a:ln>
-        </p:spPr>
-        <p:style>
-          <a:lnRef idx="2">
-            <a:schemeClr val="accent1">
-              <a:shade val="50000"/>
-            </a:schemeClr>
-          </a:lnRef>
-          <a:fillRef idx="1">
-            <a:schemeClr val="accent1"/>
-          </a:fillRef>
-          <a:effectRef idx="0">
-            <a:schemeClr val="accent1"/>
-          </a:effectRef>
-          <a:fontRef idx="minor">
-            <a:schemeClr val="lt1"/>
-          </a:fontRef>
-        </p:style>
-        <p:txBody>
-          <a:bodyPr rtlCol="0" anchor="ctr"/>
-          <a:lstStyle/>
-          <a:p>
-            <a:pPr algn="ctr"/>
-            <a:endParaRPr lang="en-SG" dirty="0"/>
-          </a:p>
-        </p:txBody>
-      </p:sp>
-      <p:sp>
-        <p:nvSpPr>
-          <p:cNvPr id="8" name="Rectangle 7">
-            <a:extLst>
-              <a:ext uri="{FF2B5EF4-FFF2-40B4-BE49-F238E27FC236}">
-                <a16:creationId xmlns:a16="http://schemas.microsoft.com/office/drawing/2014/main" id="{DC3B92C7-6C01-4A77-93FB-2388CFE70CFE}"/>
-              </a:ext>
-            </a:extLst>
-          </p:cNvPr>
-          <p:cNvSpPr/>
-          <p:nvPr/>
-        </p:nvSpPr>
-        <p:spPr>
-          <a:xfrm>
-            <a:off x="4061105" y="2027189"/>
-            <a:ext cx="1966277" cy="530274"/>
-          </a:xfrm>
-          <a:prstGeom prst="rect">
-            <a:avLst/>
-          </a:prstGeom>
-          <a:noFill/>
-          <a:ln w="38100">
-            <a:solidFill>
-              <a:srgbClr val="FF0000"/>
-            </a:solidFill>
-          </a:ln>
-        </p:spPr>
-        <p:style>
-          <a:lnRef idx="2">
-            <a:schemeClr val="accent1">
-              <a:shade val="50000"/>
-            </a:schemeClr>
-          </a:lnRef>
-          <a:fillRef idx="1">
-            <a:schemeClr val="accent1"/>
-          </a:fillRef>
-          <a:effectRef idx="0">
-            <a:schemeClr val="accent1"/>
-          </a:effectRef>
-          <a:fontRef idx="minor">
-            <a:schemeClr val="lt1"/>
-          </a:fontRef>
-        </p:style>
-        <p:txBody>
-          <a:bodyPr rtlCol="0" anchor="ctr"/>
-          <a:lstStyle/>
-          <a:p>
-            <a:pPr algn="ctr"/>
-            <a:endParaRPr lang="en-SG" dirty="0"/>
-          </a:p>
-        </p:txBody>
-      </p:sp>
-      <p:sp>
-        <p:nvSpPr>
-          <p:cNvPr id="9" name="Rectangle 8">
-            <a:extLst>
-              <a:ext uri="{FF2B5EF4-FFF2-40B4-BE49-F238E27FC236}">
-                <a16:creationId xmlns:a16="http://schemas.microsoft.com/office/drawing/2014/main" id="{D7B05CAE-3B6A-4F0B-8115-C11894827A8C}"/>
-              </a:ext>
-            </a:extLst>
-          </p:cNvPr>
-          <p:cNvSpPr/>
-          <p:nvPr/>
-        </p:nvSpPr>
-        <p:spPr>
-          <a:xfrm>
-            <a:off x="4061299" y="2555513"/>
-            <a:ext cx="1966277" cy="566428"/>
-          </a:xfrm>
-          <a:prstGeom prst="rect">
-            <a:avLst/>
-          </a:prstGeom>
-          <a:noFill/>
-          <a:ln w="38100">
-            <a:solidFill>
-              <a:srgbClr val="FF0000"/>
-            </a:solidFill>
-          </a:ln>
-        </p:spPr>
-        <p:style>
-          <a:lnRef idx="2">
-            <a:schemeClr val="accent1">
-              <a:shade val="50000"/>
-            </a:schemeClr>
-          </a:lnRef>
-          <a:fillRef idx="1">
-            <a:schemeClr val="accent1"/>
-          </a:fillRef>
-          <a:effectRef idx="0">
-            <a:schemeClr val="accent1"/>
-          </a:effectRef>
-          <a:fontRef idx="minor">
-            <a:schemeClr val="lt1"/>
-          </a:fontRef>
-        </p:style>
-        <p:txBody>
-          <a:bodyPr rtlCol="0" anchor="ctr"/>
-          <a:lstStyle/>
-          <a:p>
-            <a:pPr algn="ctr"/>
-            <a:endParaRPr lang="en-SG" dirty="0"/>
-          </a:p>
-        </p:txBody>
-      </p:sp>
-    </p:spTree>
-    <p:extLst>
-      <p:ext uri="{BB962C8B-B14F-4D97-AF65-F5344CB8AC3E}">
-        <p14:creationId xmlns:p14="http://schemas.microsoft.com/office/powerpoint/2010/main" val="1280134521"/>
-      </p:ext>
-    </p:extLst>
-  </p:cSld>
-  <p:clrMapOvr>
-    <a:masterClrMapping/>
-  </p:clrMapOvr>
-</p:sld>
-</file>
-
-<file path=ppt/slides/slide4.xml><?xml version="1.0" encoding="utf-8"?>
+<file path=ppt/slides/slide2.xml><?xml version="1.0" encoding="utf-8"?>
 <p:sld xmlns:a="http://schemas.openxmlformats.org/drawingml/2006/main" xmlns:r="http://schemas.openxmlformats.org/officeDocument/2006/relationships" xmlns:p="http://schemas.openxmlformats.org/presentationml/2006/main">
   <p:cSld>
     <p:spTree>
@@ -4990,7 +4556,7 @@
 </p:sld>
 </file>
 
-<file path=ppt/slides/slide5.xml><?xml version="1.0" encoding="utf-8"?>
+<file path=ppt/slides/slide3.xml><?xml version="1.0" encoding="utf-8"?>
 <p:sld xmlns:a="http://schemas.openxmlformats.org/drawingml/2006/main" xmlns:r="http://schemas.openxmlformats.org/officeDocument/2006/relationships" xmlns:p="http://schemas.openxmlformats.org/presentationml/2006/main">
   <p:cSld>
     <p:spTree>
@@ -5822,7 +5388,7 @@
 </p:sld>
 </file>
 
-<file path=ppt/slides/slide6.xml><?xml version="1.0" encoding="utf-8"?>
+<file path=ppt/slides/slide4.xml><?xml version="1.0" encoding="utf-8"?>
 <p:sld xmlns:a="http://schemas.openxmlformats.org/drawingml/2006/main" xmlns:r="http://schemas.openxmlformats.org/officeDocument/2006/relationships" xmlns:p="http://schemas.openxmlformats.org/presentationml/2006/main">
   <p:cSld>
     <p:spTree>

</xml_diff>